<commit_message>
Add Class Diagram image to presentation and documentation
</commit_message>
<xml_diff>
--- a/Elderberry Team - Presentation.pptx
+++ b/Elderberry Team - Presentation.pptx
@@ -8,7 +8,8 @@
     <p:sldId id="257" r:id="rId3"/>
     <p:sldId id="258" r:id="rId4"/>
     <p:sldId id="259" r:id="rId5"/>
-    <p:sldId id="260" r:id="rId6"/>
+    <p:sldId id="261" r:id="rId6"/>
+    <p:sldId id="260" r:id="rId7"/>
   </p:sldIdLst>
   <p:sldSz cx="12192000" cy="6858000"/>
   <p:notesSz cx="6858000" cy="9144000"/>
@@ -109,7 +110,7 @@
   </p:defaultTextStyle>
   <p:extLst>
     <p:ext uri="{EFAFB233-063F-42B5-8137-9DF3F51BA10A}">
-      <p15:sldGuideLst xmlns:p15="http://schemas.microsoft.com/office/powerpoint/2012/main">
+      <p15:sldGuideLst xmlns:p15="http://schemas.microsoft.com/office/powerpoint/2012/main" xmlns="">
         <p15:guide id="1" orient="horz" pos="2160">
           <p15:clr>
             <a:srgbClr val="A4A3A4"/>
@@ -1248,7 +1249,7 @@
     </p:spTree>
     <p:extLst>
       <p:ext uri="{BB962C8B-B14F-4D97-AF65-F5344CB8AC3E}">
-        <p14:creationId xmlns:p14="http://schemas.microsoft.com/office/powerpoint/2010/main" val="3757727404"/>
+        <p14:creationId xmlns:p14="http://schemas.microsoft.com/office/powerpoint/2010/main" xmlns="" val="3757727404"/>
       </p:ext>
     </p:extLst>
   </p:cSld>
@@ -1501,7 +1502,7 @@
     </p:spTree>
     <p:extLst>
       <p:ext uri="{BB962C8B-B14F-4D97-AF65-F5344CB8AC3E}">
-        <p14:creationId xmlns:p14="http://schemas.microsoft.com/office/powerpoint/2010/main" val="2565848782"/>
+        <p14:creationId xmlns:p14="http://schemas.microsoft.com/office/powerpoint/2010/main" xmlns="" val="2565848782"/>
       </p:ext>
     </p:extLst>
   </p:cSld>
@@ -2075,7 +2076,7 @@
     </p:spTree>
     <p:extLst>
       <p:ext uri="{BB962C8B-B14F-4D97-AF65-F5344CB8AC3E}">
-        <p14:creationId xmlns:p14="http://schemas.microsoft.com/office/powerpoint/2010/main" val="3599817007"/>
+        <p14:creationId xmlns:p14="http://schemas.microsoft.com/office/powerpoint/2010/main" xmlns="" val="3599817007"/>
       </p:ext>
     </p:extLst>
   </p:cSld>
@@ -2328,7 +2329,7 @@
     </p:spTree>
     <p:extLst>
       <p:ext uri="{BB962C8B-B14F-4D97-AF65-F5344CB8AC3E}">
-        <p14:creationId xmlns:p14="http://schemas.microsoft.com/office/powerpoint/2010/main" val="2396703285"/>
+        <p14:creationId xmlns:p14="http://schemas.microsoft.com/office/powerpoint/2010/main" xmlns="" val="2396703285"/>
       </p:ext>
     </p:extLst>
   </p:cSld>
@@ -2902,7 +2903,7 @@
     </p:spTree>
     <p:extLst>
       <p:ext uri="{BB962C8B-B14F-4D97-AF65-F5344CB8AC3E}">
-        <p14:creationId xmlns:p14="http://schemas.microsoft.com/office/powerpoint/2010/main" val="3697398870"/>
+        <p14:creationId xmlns:p14="http://schemas.microsoft.com/office/powerpoint/2010/main" xmlns="" val="3697398870"/>
       </p:ext>
     </p:extLst>
   </p:cSld>
@@ -3215,7 +3216,7 @@
     </p:spTree>
     <p:extLst>
       <p:ext uri="{BB962C8B-B14F-4D97-AF65-F5344CB8AC3E}">
-        <p14:creationId xmlns:p14="http://schemas.microsoft.com/office/powerpoint/2010/main" val="1704312405"/>
+        <p14:creationId xmlns:p14="http://schemas.microsoft.com/office/powerpoint/2010/main" xmlns="" val="1704312405"/>
       </p:ext>
     </p:extLst>
   </p:cSld>
@@ -3387,7 +3388,7 @@
     </p:spTree>
     <p:extLst>
       <p:ext uri="{BB962C8B-B14F-4D97-AF65-F5344CB8AC3E}">
-        <p14:creationId xmlns:p14="http://schemas.microsoft.com/office/powerpoint/2010/main" val="2150809581"/>
+        <p14:creationId xmlns:p14="http://schemas.microsoft.com/office/powerpoint/2010/main" xmlns="" val="2150809581"/>
       </p:ext>
     </p:extLst>
   </p:cSld>
@@ -3569,7 +3570,7 @@
     </p:spTree>
     <p:extLst>
       <p:ext uri="{BB962C8B-B14F-4D97-AF65-F5344CB8AC3E}">
-        <p14:creationId xmlns:p14="http://schemas.microsoft.com/office/powerpoint/2010/main" val="4029164869"/>
+        <p14:creationId xmlns:p14="http://schemas.microsoft.com/office/powerpoint/2010/main" xmlns="" val="4029164869"/>
       </p:ext>
     </p:extLst>
   </p:cSld>
@@ -3747,7 +3748,7 @@
     </p:spTree>
     <p:extLst>
       <p:ext uri="{BB962C8B-B14F-4D97-AF65-F5344CB8AC3E}">
-        <p14:creationId xmlns:p14="http://schemas.microsoft.com/office/powerpoint/2010/main" val="2556283938"/>
+        <p14:creationId xmlns:p14="http://schemas.microsoft.com/office/powerpoint/2010/main" xmlns="" val="2556283938"/>
       </p:ext>
     </p:extLst>
   </p:cSld>
@@ -3996,7 +3997,7 @@
     </p:spTree>
     <p:extLst>
       <p:ext uri="{BB962C8B-B14F-4D97-AF65-F5344CB8AC3E}">
-        <p14:creationId xmlns:p14="http://schemas.microsoft.com/office/powerpoint/2010/main" val="2477949077"/>
+        <p14:creationId xmlns:p14="http://schemas.microsoft.com/office/powerpoint/2010/main" xmlns="" val="2477949077"/>
       </p:ext>
     </p:extLst>
   </p:cSld>
@@ -4230,7 +4231,7 @@
     </p:spTree>
     <p:extLst>
       <p:ext uri="{BB962C8B-B14F-4D97-AF65-F5344CB8AC3E}">
-        <p14:creationId xmlns:p14="http://schemas.microsoft.com/office/powerpoint/2010/main" val="687616641"/>
+        <p14:creationId xmlns:p14="http://schemas.microsoft.com/office/powerpoint/2010/main" xmlns="" val="687616641"/>
       </p:ext>
     </p:extLst>
   </p:cSld>
@@ -4606,7 +4607,7 @@
     </p:spTree>
     <p:extLst>
       <p:ext uri="{BB962C8B-B14F-4D97-AF65-F5344CB8AC3E}">
-        <p14:creationId xmlns:p14="http://schemas.microsoft.com/office/powerpoint/2010/main" val="2350331253"/>
+        <p14:creationId xmlns:p14="http://schemas.microsoft.com/office/powerpoint/2010/main" xmlns="" val="2350331253"/>
       </p:ext>
     </p:extLst>
   </p:cSld>
@@ -4731,7 +4732,7 @@
     </p:spTree>
     <p:extLst>
       <p:ext uri="{BB962C8B-B14F-4D97-AF65-F5344CB8AC3E}">
-        <p14:creationId xmlns:p14="http://schemas.microsoft.com/office/powerpoint/2010/main" val="1195165885"/>
+        <p14:creationId xmlns:p14="http://schemas.microsoft.com/office/powerpoint/2010/main" xmlns="" val="1195165885"/>
       </p:ext>
     </p:extLst>
   </p:cSld>
@@ -4828,7 +4829,7 @@
     </p:spTree>
     <p:extLst>
       <p:ext uri="{BB962C8B-B14F-4D97-AF65-F5344CB8AC3E}">
-        <p14:creationId xmlns:p14="http://schemas.microsoft.com/office/powerpoint/2010/main" val="897867090"/>
+        <p14:creationId xmlns:p14="http://schemas.microsoft.com/office/powerpoint/2010/main" xmlns="" val="897867090"/>
       </p:ext>
     </p:extLst>
   </p:cSld>
@@ -5085,7 +5086,7 @@
     </p:spTree>
     <p:extLst>
       <p:ext uri="{BB962C8B-B14F-4D97-AF65-F5344CB8AC3E}">
-        <p14:creationId xmlns:p14="http://schemas.microsoft.com/office/powerpoint/2010/main" val="1721625385"/>
+        <p14:creationId xmlns:p14="http://schemas.microsoft.com/office/powerpoint/2010/main" xmlns="" val="1721625385"/>
       </p:ext>
     </p:extLst>
   </p:cSld>
@@ -5350,7 +5351,7 @@
     </p:spTree>
     <p:extLst>
       <p:ext uri="{BB962C8B-B14F-4D97-AF65-F5344CB8AC3E}">
-        <p14:creationId xmlns:p14="http://schemas.microsoft.com/office/powerpoint/2010/main" val="4290783377"/>
+        <p14:creationId xmlns:p14="http://schemas.microsoft.com/office/powerpoint/2010/main" xmlns="" val="4290783377"/>
       </p:ext>
     </p:extLst>
   </p:cSld>
@@ -6470,7 +6471,7 @@
     </p:spTree>
     <p:extLst>
       <p:ext uri="{BB962C8B-B14F-4D97-AF65-F5344CB8AC3E}">
-        <p14:creationId xmlns:p14="http://schemas.microsoft.com/office/powerpoint/2010/main" val="165419796"/>
+        <p14:creationId xmlns:p14="http://schemas.microsoft.com/office/powerpoint/2010/main" xmlns="" val="165419796"/>
       </p:ext>
     </p:extLst>
   </p:cSld>
@@ -7002,18 +7003,18 @@
     </p:spTree>
     <p:extLst>
       <p:ext uri="{BB962C8B-B14F-4D97-AF65-F5344CB8AC3E}">
-        <p14:creationId xmlns:p14="http://schemas.microsoft.com/office/powerpoint/2010/main" val="2387950910"/>
+        <p14:creationId xmlns:p14="http://schemas.microsoft.com/office/powerpoint/2010/main" xmlns="" val="2387950910"/>
       </p:ext>
     </p:extLst>
   </p:cSld>
   <p:clrMapOvr>
     <a:masterClrMapping/>
   </p:clrMapOvr>
-  <mc:AlternateContent xmlns:mc="http://schemas.openxmlformats.org/markup-compatibility/2006" xmlns:p14="http://schemas.microsoft.com/office/powerpoint/2010/main">
-    <mc:Choice Requires="p14">
+  <mc:AlternateContent xmlns:mc="http://schemas.openxmlformats.org/markup-compatibility/2006">
+    <mc:Choice xmlns:p14="http://schemas.microsoft.com/office/powerpoint/2010/main" xmlns="" Requires="p14">
       <p:transition spd="slow" p14:dur="2000"/>
     </mc:Choice>
-    <mc:Fallback xmlns="">
+    <mc:Fallback>
       <p:transition spd="slow"/>
     </mc:Fallback>
   </mc:AlternateContent>
@@ -7345,18 +7346,18 @@
     </p:spTree>
     <p:extLst>
       <p:ext uri="{BB962C8B-B14F-4D97-AF65-F5344CB8AC3E}">
-        <p14:creationId xmlns:p14="http://schemas.microsoft.com/office/powerpoint/2010/main" val="1450568556"/>
+        <p14:creationId xmlns:p14="http://schemas.microsoft.com/office/powerpoint/2010/main" xmlns="" val="1450568556"/>
       </p:ext>
     </p:extLst>
   </p:cSld>
   <p:clrMapOvr>
     <a:masterClrMapping/>
   </p:clrMapOvr>
-  <mc:AlternateContent xmlns:mc="http://schemas.openxmlformats.org/markup-compatibility/2006" xmlns:p14="http://schemas.microsoft.com/office/powerpoint/2010/main">
-    <mc:Choice Requires="p14">
+  <mc:AlternateContent xmlns:mc="http://schemas.openxmlformats.org/markup-compatibility/2006">
+    <mc:Choice xmlns:p14="http://schemas.microsoft.com/office/powerpoint/2010/main" xmlns="" Requires="p14">
       <p:transition spd="slow" p14:dur="2000"/>
     </mc:Choice>
-    <mc:Fallback xmlns="">
+    <mc:Fallback>
       <p:transition spd="slow"/>
     </mc:Fallback>
   </mc:AlternateContent>
@@ -7436,7 +7437,7 @@
           <a:blip r:embed="rId2">
             <a:extLst>
               <a:ext uri="{28A0092B-C50C-407E-A947-70E740481C1C}">
-                <a14:useLocalDpi xmlns:a14="http://schemas.microsoft.com/office/drawing/2010/main" val="0"/>
+                <a14:useLocalDpi xmlns:a14="http://schemas.microsoft.com/office/drawing/2010/main" xmlns="" val="0"/>
               </a:ext>
             </a:extLst>
           </a:blip>
@@ -7457,18 +7458,18 @@
     </p:spTree>
     <p:extLst>
       <p:ext uri="{BB962C8B-B14F-4D97-AF65-F5344CB8AC3E}">
-        <p14:creationId xmlns:p14="http://schemas.microsoft.com/office/powerpoint/2010/main" val="3807692846"/>
+        <p14:creationId xmlns:p14="http://schemas.microsoft.com/office/powerpoint/2010/main" xmlns="" val="3807692846"/>
       </p:ext>
     </p:extLst>
   </p:cSld>
   <p:clrMapOvr>
     <a:masterClrMapping/>
   </p:clrMapOvr>
-  <mc:AlternateContent xmlns:mc="http://schemas.openxmlformats.org/markup-compatibility/2006" xmlns:p14="http://schemas.microsoft.com/office/powerpoint/2010/main">
-    <mc:Choice Requires="p14">
+  <mc:AlternateContent xmlns:mc="http://schemas.openxmlformats.org/markup-compatibility/2006">
+    <mc:Choice xmlns:p14="http://schemas.microsoft.com/office/powerpoint/2010/main" xmlns="" Requires="p14">
       <p:transition spd="slow" p14:dur="2000"/>
     </mc:Choice>
-    <mc:Fallback xmlns="">
+    <mc:Fallback>
       <p:transition spd="slow"/>
     </mc:Fallback>
   </mc:AlternateContent>
@@ -7499,6 +7500,55 @@
           <a:chExt cx="0" cy="0"/>
         </a:xfrm>
       </p:grpSpPr>
+      <p:pic>
+        <p:nvPicPr>
+          <p:cNvPr id="4" name="Picture 3" descr="ClassDiagram1.png"/>
+          <p:cNvPicPr>
+            <a:picLocks noChangeAspect="1"/>
+          </p:cNvPicPr>
+          <p:nvPr/>
+        </p:nvPicPr>
+        <p:blipFill>
+          <a:blip r:embed="rId2"/>
+          <a:stretch>
+            <a:fillRect/>
+          </a:stretch>
+        </p:blipFill>
+        <p:spPr>
+          <a:xfrm>
+            <a:off x="0" y="370012"/>
+            <a:ext cx="12192000" cy="6117976"/>
+          </a:xfrm>
+          <a:prstGeom prst="rect">
+            <a:avLst/>
+          </a:prstGeom>
+        </p:spPr>
+      </p:pic>
+    </p:spTree>
+  </p:cSld>
+  <p:clrMapOvr>
+    <a:masterClrMapping/>
+  </p:clrMapOvr>
+</p:sld>
+</file>
+
+<file path=ppt/slides/slide5.xml><?xml version="1.0" encoding="utf-8"?>
+<p:sld xmlns:a="http://schemas.openxmlformats.org/drawingml/2006/main" xmlns:r="http://schemas.openxmlformats.org/officeDocument/2006/relationships" xmlns:p="http://schemas.openxmlformats.org/presentationml/2006/main">
+  <p:cSld>
+    <p:spTree>
+      <p:nvGrpSpPr>
+        <p:cNvPr id="1" name=""/>
+        <p:cNvGrpSpPr/>
+        <p:nvPr/>
+      </p:nvGrpSpPr>
+      <p:grpSpPr>
+        <a:xfrm>
+          <a:off x="0" y="0"/>
+          <a:ext cx="0" cy="0"/>
+          <a:chOff x="0" y="0"/>
+          <a:chExt cx="0" cy="0"/>
+        </a:xfrm>
+      </p:grpSpPr>
       <p:sp>
         <p:nvSpPr>
           <p:cNvPr id="3" name="Content Placeholder 2"/>
@@ -7525,11 +7575,19 @@
               <a:buNone/>
             </a:pPr>
             <a:r>
-              <a:rPr lang="en-US" sz="5400" dirty="0"/>
+              <a:rPr lang="en-US" sz="5400" dirty="0">
+                <a:solidFill>
+                  <a:schemeClr val="accent1"/>
+                </a:solidFill>
+              </a:rPr>
               <a:t>Elderberry repository</a:t>
             </a:r>
             <a:r>
-              <a:rPr lang="en-US" sz="5400" dirty="0" smtClean="0"/>
+              <a:rPr lang="en-US" sz="5400" dirty="0" smtClean="0">
+                <a:solidFill>
+                  <a:schemeClr val="accent1"/>
+                </a:solidFill>
+              </a:rPr>
               <a:t>:</a:t>
             </a:r>
           </a:p>
@@ -7555,7 +7613,7 @@
     </p:spTree>
     <p:extLst>
       <p:ext uri="{BB962C8B-B14F-4D97-AF65-F5344CB8AC3E}">
-        <p14:creationId xmlns:p14="http://schemas.microsoft.com/office/powerpoint/2010/main" val="622750253"/>
+        <p14:creationId xmlns:p14="http://schemas.microsoft.com/office/powerpoint/2010/main" xmlns="" val="622750253"/>
       </p:ext>
     </p:extLst>
   </p:cSld>
@@ -7816,7 +7874,7 @@
   <a:extraClrSchemeLst/>
   <a:extLst>
     <a:ext uri="{05A4C25C-085E-4340-85A3-A5531E510DB2}">
-      <thm15:themeFamily xmlns:thm15="http://schemas.microsoft.com/office/thememl/2012/main" name="Facet" id="{C0C680CD-088A-49FC-A102-D699147F32B2}" vid="{CFBC31BA-B70F-4F30-BCAA-4F3011E16C4D}"/>
+      <thm15:themeFamily xmlns:thm15="http://schemas.microsoft.com/office/thememl/2012/main" xmlns="" name="Facet" id="{C0C680CD-088A-49FC-A102-D699147F32B2}" vid="{CFBC31BA-B70F-4F30-BCAA-4F3011E16C4D}"/>
     </a:ext>
   </a:extLst>
 </a:theme>

</xml_diff>